<commit_message>
Custom search strategies can be implemented by extending the janala.solvers.Strategy class.  See DFSStrategy for a DFS search strategy implementation.
</commit_message>
<xml_diff>
--- a/janala.pptx
+++ b/janala.pptx
@@ -290,7 +290,7 @@
           <a:p>
             <a:fld id="{AE8DA00F-06BA-5B45-B076-7DB8B868C6E5}" type="datetimeFigureOut">
               <a:rPr lang="en-US" smtClean="0"/>
-              <a:t>6/26/12</a:t>
+              <a:t>7/9/12</a:t>
             </a:fld>
             <a:endParaRPr lang="en-US"/>
           </a:p>
@@ -460,7 +460,7 @@
           <a:p>
             <a:fld id="{AE8DA00F-06BA-5B45-B076-7DB8B868C6E5}" type="datetimeFigureOut">
               <a:rPr lang="en-US" smtClean="0"/>
-              <a:t>6/26/12</a:t>
+              <a:t>7/9/12</a:t>
             </a:fld>
             <a:endParaRPr lang="en-US"/>
           </a:p>
@@ -640,7 +640,7 @@
           <a:p>
             <a:fld id="{AE8DA00F-06BA-5B45-B076-7DB8B868C6E5}" type="datetimeFigureOut">
               <a:rPr lang="en-US" smtClean="0"/>
-              <a:t>6/26/12</a:t>
+              <a:t>7/9/12</a:t>
             </a:fld>
             <a:endParaRPr lang="en-US"/>
           </a:p>
@@ -810,7 +810,7 @@
           <a:p>
             <a:fld id="{AE8DA00F-06BA-5B45-B076-7DB8B868C6E5}" type="datetimeFigureOut">
               <a:rPr lang="en-US" smtClean="0"/>
-              <a:t>6/26/12</a:t>
+              <a:t>7/9/12</a:t>
             </a:fld>
             <a:endParaRPr lang="en-US"/>
           </a:p>
@@ -1056,7 +1056,7 @@
           <a:p>
             <a:fld id="{AE8DA00F-06BA-5B45-B076-7DB8B868C6E5}" type="datetimeFigureOut">
               <a:rPr lang="en-US" smtClean="0"/>
-              <a:t>6/26/12</a:t>
+              <a:t>7/9/12</a:t>
             </a:fld>
             <a:endParaRPr lang="en-US"/>
           </a:p>
@@ -1344,7 +1344,7 @@
           <a:p>
             <a:fld id="{AE8DA00F-06BA-5B45-B076-7DB8B868C6E5}" type="datetimeFigureOut">
               <a:rPr lang="en-US" smtClean="0"/>
-              <a:t>6/26/12</a:t>
+              <a:t>7/9/12</a:t>
             </a:fld>
             <a:endParaRPr lang="en-US"/>
           </a:p>
@@ -1766,7 +1766,7 @@
           <a:p>
             <a:fld id="{AE8DA00F-06BA-5B45-B076-7DB8B868C6E5}" type="datetimeFigureOut">
               <a:rPr lang="en-US" smtClean="0"/>
-              <a:t>6/26/12</a:t>
+              <a:t>7/9/12</a:t>
             </a:fld>
             <a:endParaRPr lang="en-US"/>
           </a:p>
@@ -1884,7 +1884,7 @@
           <a:p>
             <a:fld id="{AE8DA00F-06BA-5B45-B076-7DB8B868C6E5}" type="datetimeFigureOut">
               <a:rPr lang="en-US" smtClean="0"/>
-              <a:t>6/26/12</a:t>
+              <a:t>7/9/12</a:t>
             </a:fld>
             <a:endParaRPr lang="en-US"/>
           </a:p>
@@ -1979,7 +1979,7 @@
           <a:p>
             <a:fld id="{AE8DA00F-06BA-5B45-B076-7DB8B868C6E5}" type="datetimeFigureOut">
               <a:rPr lang="en-US" smtClean="0"/>
-              <a:t>6/26/12</a:t>
+              <a:t>7/9/12</a:t>
             </a:fld>
             <a:endParaRPr lang="en-US"/>
           </a:p>
@@ -2256,7 +2256,7 @@
           <a:p>
             <a:fld id="{AE8DA00F-06BA-5B45-B076-7DB8B868C6E5}" type="datetimeFigureOut">
               <a:rPr lang="en-US" smtClean="0"/>
-              <a:t>6/26/12</a:t>
+              <a:t>7/9/12</a:t>
             </a:fld>
             <a:endParaRPr lang="en-US"/>
           </a:p>
@@ -2509,7 +2509,7 @@
           <a:p>
             <a:fld id="{AE8DA00F-06BA-5B45-B076-7DB8B868C6E5}" type="datetimeFigureOut">
               <a:rPr lang="en-US" smtClean="0"/>
-              <a:t>6/26/12</a:t>
+              <a:t>7/9/12</a:t>
             </a:fld>
             <a:endParaRPr lang="en-US"/>
           </a:p>
@@ -2722,7 +2722,7 @@
           <a:p>
             <a:fld id="{AE8DA00F-06BA-5B45-B076-7DB8B868C6E5}" type="datetimeFigureOut">
               <a:rPr lang="en-US" smtClean="0"/>
-              <a:t>6/26/12</a:t>
+              <a:t>7/9/12</a:t>
             </a:fld>
             <a:endParaRPr lang="en-US"/>
           </a:p>
@@ -3955,21 +3955,12 @@
           <a:lstStyle/>
           <a:p>
             <a:r>
+              <a:rPr lang="en-US" sz="1800" smtClean="0"/>
+              <a:t>Handles </a:t>
+            </a:r>
+            <a:r>
               <a:rPr lang="en-US" sz="1800" dirty="0" smtClean="0"/>
-              <a:t>Didn’t end up using WISE</a:t>
-            </a:r>
-          </a:p>
-          <a:p>
-            <a:pPr lvl="1"/>
-            <a:r>
-              <a:rPr lang="en-US" sz="1400" dirty="0" smtClean="0"/>
-              <a:t>11K LOC so far</a:t>
-            </a:r>
-          </a:p>
-          <a:p>
-            <a:r>
-              <a:rPr lang="en-US" sz="1800" dirty="0" smtClean="0"/>
-              <a:t>Handles integral types (</a:t>
+              <a:t>integral types (</a:t>
             </a:r>
             <a:r>
               <a:rPr lang="en-US" sz="1800" dirty="0" err="1" smtClean="0"/>
@@ -4035,22 +4026,9 @@
           <a:p>
             <a:r>
               <a:rPr lang="en-US" sz="1800" dirty="0" smtClean="0"/>
-              <a:t>Need to handle String</a:t>
-            </a:r>
-          </a:p>
-          <a:p>
-            <a:r>
-              <a:rPr lang="en-US" sz="1800" dirty="0" smtClean="0"/>
-              <a:t>Need to handle Objects such as </a:t>
-            </a:r>
-            <a:r>
-              <a:rPr lang="en-US" sz="1800" dirty="0" err="1" smtClean="0"/>
-              <a:t>ArrayList</a:t>
-            </a:r>
-            <a:r>
-              <a:rPr lang="en-US" sz="1800" dirty="0" smtClean="0"/>
-              <a:t>, Lists etc. and native calls abstractly</a:t>
-            </a:r>
+              <a:t>Handle String equals.</a:t>
+            </a:r>
+            <a:endParaRPr lang="en-US" sz="1800" dirty="0" smtClean="0"/>
           </a:p>
           <a:p>
             <a:r>
@@ -4085,45 +4063,31 @@
           <a:p>
             <a:r>
               <a:rPr lang="en-US" sz="1800" dirty="0" smtClean="0"/>
-              <a:t>Override </a:t>
+              <a:t>Extend </a:t>
             </a:r>
             <a:r>
               <a:rPr lang="en-US" sz="1800" dirty="0" err="1" smtClean="0"/>
-              <a:t>janala.solvers.History</a:t>
+              <a:t>janala.solvers.Strategy</a:t>
             </a:r>
             <a:r>
               <a:rPr lang="en-US" sz="1800" dirty="0" smtClean="0"/>
-              <a:t> (public void </a:t>
-            </a:r>
+              <a:t> to </a:t>
+            </a:r>
+            <a:r>
+              <a:rPr lang="en-US" sz="1800" dirty="0" smtClean="0"/>
+              <a:t>implement custom search strategies</a:t>
+            </a:r>
+          </a:p>
+          <a:p>
             <a:r>
               <a:rPr lang="en-US" sz="1800" dirty="0" err="1" smtClean="0"/>
-              <a:t>solveAndSave</a:t>
+              <a:t>database.table</a:t>
             </a:r>
             <a:r>
               <a:rPr lang="en-US" sz="1800" dirty="0" smtClean="0"/>
-              <a:t>(</a:t>
-            </a:r>
-            <a:r>
-              <a:rPr lang="en-US" sz="1800" dirty="0" err="1" smtClean="0"/>
-              <a:t>ArrayList</a:t>
-            </a:r>
-            <a:r>
-              <a:rPr lang="en-US" sz="1800" dirty="0" smtClean="0"/>
-              <a:t>&lt;Value&gt; inputs)) to implement custom search strategies</a:t>
-            </a:r>
-          </a:p>
-          <a:p>
-            <a:r>
-              <a:rPr lang="en-US" sz="1800" dirty="0" smtClean="0"/>
-              <a:t>No solution for handling SQL queries</a:t>
-            </a:r>
-          </a:p>
-          <a:p>
-            <a:pPr lvl="1"/>
-            <a:r>
-              <a:rPr lang="en-US" sz="1400" dirty="0" smtClean="0"/>
-              <a:t>Probably use Arrays and Tuples to model tables</a:t>
-            </a:r>
+              <a:t>.* has libraries for modeling SQL queries and creating symbolic databases</a:t>
+            </a:r>
+            <a:endParaRPr lang="en-US" sz="1400" dirty="0" smtClean="0"/>
           </a:p>
         </p:txBody>
       </p:sp>

</xml_diff>

<commit_message>
partly ported to cvc4. some tests are failing.
</commit_message>
<xml_diff>
--- a/janala.pptx
+++ b/janala.pptx
@@ -18,6 +18,10 @@
     <p:sldId id="266" r:id="rId12"/>
     <p:sldId id="267" r:id="rId13"/>
     <p:sldId id="268" r:id="rId14"/>
+    <p:sldId id="269" r:id="rId15"/>
+    <p:sldId id="270" r:id="rId16"/>
+    <p:sldId id="271" r:id="rId17"/>
+    <p:sldId id="272" r:id="rId18"/>
   </p:sldIdLst>
   <p:sldSz cx="9144000" cy="6858000" type="screen4x3"/>
   <p:notesSz cx="6858000" cy="9144000"/>
@@ -300,7 +304,7 @@
           <a:p>
             <a:fld id="{AE8DA00F-06BA-5B45-B076-7DB8B868C6E5}" type="datetimeFigureOut">
               <a:rPr lang="en-US" smtClean="0"/>
-              <a:t>12/15/13</a:t>
+              <a:t>3/14/14</a:t>
             </a:fld>
             <a:endParaRPr lang="en-US"/>
           </a:p>
@@ -470,7 +474,7 @@
           <a:p>
             <a:fld id="{AE8DA00F-06BA-5B45-B076-7DB8B868C6E5}" type="datetimeFigureOut">
               <a:rPr lang="en-US" smtClean="0"/>
-              <a:t>12/15/13</a:t>
+              <a:t>3/14/14</a:t>
             </a:fld>
             <a:endParaRPr lang="en-US"/>
           </a:p>
@@ -650,7 +654,7 @@
           <a:p>
             <a:fld id="{AE8DA00F-06BA-5B45-B076-7DB8B868C6E5}" type="datetimeFigureOut">
               <a:rPr lang="en-US" smtClean="0"/>
-              <a:t>12/15/13</a:t>
+              <a:t>3/14/14</a:t>
             </a:fld>
             <a:endParaRPr lang="en-US"/>
           </a:p>
@@ -820,7 +824,7 @@
           <a:p>
             <a:fld id="{AE8DA00F-06BA-5B45-B076-7DB8B868C6E5}" type="datetimeFigureOut">
               <a:rPr lang="en-US" smtClean="0"/>
-              <a:t>12/15/13</a:t>
+              <a:t>3/14/14</a:t>
             </a:fld>
             <a:endParaRPr lang="en-US"/>
           </a:p>
@@ -1066,7 +1070,7 @@
           <a:p>
             <a:fld id="{AE8DA00F-06BA-5B45-B076-7DB8B868C6E5}" type="datetimeFigureOut">
               <a:rPr lang="en-US" smtClean="0"/>
-              <a:t>12/15/13</a:t>
+              <a:t>3/14/14</a:t>
             </a:fld>
             <a:endParaRPr lang="en-US"/>
           </a:p>
@@ -1354,7 +1358,7 @@
           <a:p>
             <a:fld id="{AE8DA00F-06BA-5B45-B076-7DB8B868C6E5}" type="datetimeFigureOut">
               <a:rPr lang="en-US" smtClean="0"/>
-              <a:t>12/15/13</a:t>
+              <a:t>3/14/14</a:t>
             </a:fld>
             <a:endParaRPr lang="en-US"/>
           </a:p>
@@ -1776,7 +1780,7 @@
           <a:p>
             <a:fld id="{AE8DA00F-06BA-5B45-B076-7DB8B868C6E5}" type="datetimeFigureOut">
               <a:rPr lang="en-US" smtClean="0"/>
-              <a:t>12/15/13</a:t>
+              <a:t>3/14/14</a:t>
             </a:fld>
             <a:endParaRPr lang="en-US"/>
           </a:p>
@@ -1894,7 +1898,7 @@
           <a:p>
             <a:fld id="{AE8DA00F-06BA-5B45-B076-7DB8B868C6E5}" type="datetimeFigureOut">
               <a:rPr lang="en-US" smtClean="0"/>
-              <a:t>12/15/13</a:t>
+              <a:t>3/14/14</a:t>
             </a:fld>
             <a:endParaRPr lang="en-US"/>
           </a:p>
@@ -1989,7 +1993,7 @@
           <a:p>
             <a:fld id="{AE8DA00F-06BA-5B45-B076-7DB8B868C6E5}" type="datetimeFigureOut">
               <a:rPr lang="en-US" smtClean="0"/>
-              <a:t>12/15/13</a:t>
+              <a:t>3/14/14</a:t>
             </a:fld>
             <a:endParaRPr lang="en-US"/>
           </a:p>
@@ -2266,7 +2270,7 @@
           <a:p>
             <a:fld id="{AE8DA00F-06BA-5B45-B076-7DB8B868C6E5}" type="datetimeFigureOut">
               <a:rPr lang="en-US" smtClean="0"/>
-              <a:t>12/15/13</a:t>
+              <a:t>3/14/14</a:t>
             </a:fld>
             <a:endParaRPr lang="en-US"/>
           </a:p>
@@ -2519,7 +2523,7 @@
           <a:p>
             <a:fld id="{AE8DA00F-06BA-5B45-B076-7DB8B868C6E5}" type="datetimeFigureOut">
               <a:rPr lang="en-US" smtClean="0"/>
-              <a:t>12/15/13</a:t>
+              <a:t>3/14/14</a:t>
             </a:fld>
             <a:endParaRPr lang="en-US"/>
           </a:p>
@@ -2732,7 +2736,7 @@
           <a:p>
             <a:fld id="{AE8DA00F-06BA-5B45-B076-7DB8B868C6E5}" type="datetimeFigureOut">
               <a:rPr lang="en-US" smtClean="0"/>
-              <a:t>12/15/13</a:t>
+              <a:t>3/14/14</a:t>
             </a:fld>
             <a:endParaRPr lang="en-US"/>
           </a:p>
@@ -3576,7 +3580,6 @@
               <a:rPr lang="en-US" dirty="0"/>
               <a:t>/tests/ManyColumnsRecords2.java</a:t>
             </a:r>
-            <a:endParaRPr lang="en-US" dirty="0"/>
           </a:p>
         </p:txBody>
       </p:sp>
@@ -4848,6 +4851,494 @@
     <p:extLst>
       <p:ext uri="{BB962C8B-B14F-4D97-AF65-F5344CB8AC3E}">
         <p14:creationId xmlns:p14="http://schemas.microsoft.com/office/powerpoint/2010/main" val="2283590571"/>
+      </p:ext>
+    </p:extLst>
+  </p:cSld>
+  <p:clrMapOvr>
+    <a:masterClrMapping/>
+  </p:clrMapOvr>
+</p:sld>
+</file>
+
+<file path=ppt/slides/slide14.xml><?xml version="1.0" encoding="utf-8"?>
+<p:sld xmlns:a="http://schemas.openxmlformats.org/drawingml/2006/main" xmlns:r="http://schemas.openxmlformats.org/officeDocument/2006/relationships" xmlns:p="http://schemas.openxmlformats.org/presentationml/2006/main">
+  <p:cSld>
+    <p:spTree>
+      <p:nvGrpSpPr>
+        <p:cNvPr id="1" name=""/>
+        <p:cNvGrpSpPr/>
+        <p:nvPr/>
+      </p:nvGrpSpPr>
+      <p:grpSpPr>
+        <a:xfrm>
+          <a:off x="0" y="0"/>
+          <a:ext cx="0" cy="0"/>
+          <a:chOff x="0" y="0"/>
+          <a:chExt cx="0" cy="0"/>
+        </a:xfrm>
+      </p:grpSpPr>
+      <p:sp>
+        <p:nvSpPr>
+          <p:cNvPr id="2" name="Title 1"/>
+          <p:cNvSpPr>
+            <a:spLocks noGrp="1"/>
+          </p:cNvSpPr>
+          <p:nvPr>
+            <p:ph type="title"/>
+          </p:nvPr>
+        </p:nvSpPr>
+        <p:spPr/>
+        <p:txBody>
+          <a:bodyPr>
+            <a:normAutofit fontScale="90000"/>
+          </a:bodyPr>
+          <a:lstStyle/>
+          <a:p>
+            <a:r>
+              <a:rPr lang="en-US" dirty="0" smtClean="0"/>
+              <a:t>Performance Improvement of CATG</a:t>
+            </a:r>
+            <a:endParaRPr lang="en-US" dirty="0"/>
+          </a:p>
+        </p:txBody>
+      </p:sp>
+      <p:sp>
+        <p:nvSpPr>
+          <p:cNvPr id="3" name="Content Placeholder 2"/>
+          <p:cNvSpPr>
+            <a:spLocks noGrp="1"/>
+          </p:cNvSpPr>
+          <p:nvPr>
+            <p:ph idx="1"/>
+          </p:nvPr>
+        </p:nvSpPr>
+        <p:spPr/>
+        <p:txBody>
+          <a:bodyPr>
+            <a:normAutofit fontScale="77500" lnSpcReduction="20000"/>
+          </a:bodyPr>
+          <a:lstStyle/>
+          <a:p>
+            <a:r>
+              <a:rPr lang="en-US" dirty="0" smtClean="0"/>
+              <a:t>Improved performance of CATG by at least 2X</a:t>
+            </a:r>
+          </a:p>
+          <a:p>
+            <a:pPr lvl="1"/>
+            <a:r>
+              <a:rPr lang="en-US" dirty="0" smtClean="0"/>
+              <a:t>Previously each test generation execution of CATG had two phases</a:t>
+            </a:r>
+          </a:p>
+          <a:p>
+            <a:pPr lvl="2"/>
+            <a:r>
+              <a:rPr lang="en-US" dirty="0" smtClean="0"/>
+              <a:t>Recording of all instructions executed on a concrete test input</a:t>
+            </a:r>
+          </a:p>
+          <a:p>
+            <a:pPr lvl="2"/>
+            <a:r>
+              <a:rPr lang="en-US" dirty="0" smtClean="0"/>
+              <a:t>Replay and reinterpret logged instructions in a second execution</a:t>
+            </a:r>
+          </a:p>
+          <a:p>
+            <a:pPr lvl="2"/>
+            <a:r>
+              <a:rPr lang="en-US" dirty="0" smtClean="0"/>
+              <a:t>This was done because certain class information were not available during recording</a:t>
+            </a:r>
+          </a:p>
+          <a:p>
+            <a:pPr lvl="1"/>
+            <a:r>
+              <a:rPr lang="en-US" dirty="0" smtClean="0"/>
+              <a:t>CATG now generates a test input in a single phase</a:t>
+            </a:r>
+          </a:p>
+          <a:p>
+            <a:pPr lvl="2"/>
+            <a:r>
+              <a:rPr lang="en-US" dirty="0" smtClean="0"/>
+              <a:t>No separate record and replay phases</a:t>
+            </a:r>
+          </a:p>
+          <a:p>
+            <a:pPr lvl="2"/>
+            <a:r>
+              <a:rPr lang="en-US" dirty="0" err="1" smtClean="0"/>
+              <a:t>Concolic</a:t>
+            </a:r>
+            <a:r>
+              <a:rPr lang="en-US" dirty="0" smtClean="0"/>
+              <a:t> testing takes place during normal execution of a program</a:t>
+            </a:r>
+          </a:p>
+          <a:p>
+            <a:pPr lvl="2"/>
+            <a:r>
+              <a:rPr lang="en-US" dirty="0" smtClean="0"/>
+              <a:t>Handled missing class information by modifying instrumentation and by populating class information on demand</a:t>
+            </a:r>
+          </a:p>
+          <a:p>
+            <a:pPr lvl="1"/>
+            <a:r>
+              <a:rPr lang="en-US" dirty="0" smtClean="0"/>
+              <a:t>Single phase </a:t>
+            </a:r>
+            <a:r>
+              <a:rPr lang="en-US" dirty="0" err="1" smtClean="0"/>
+              <a:t>concolic</a:t>
+            </a:r>
+            <a:r>
+              <a:rPr lang="en-US" dirty="0" smtClean="0"/>
+              <a:t> testing is necessary in future if we want to avoid restarting JVM for each test execution</a:t>
+            </a:r>
+          </a:p>
+          <a:p>
+            <a:pPr lvl="2"/>
+            <a:r>
+              <a:rPr lang="en-US" dirty="0" smtClean="0"/>
+              <a:t>Avoiding JVM restart should give another 5X-100X speedup</a:t>
+            </a:r>
+            <a:endParaRPr lang="en-US" dirty="0"/>
+          </a:p>
+        </p:txBody>
+      </p:sp>
+    </p:spTree>
+    <p:extLst>
+      <p:ext uri="{BB962C8B-B14F-4D97-AF65-F5344CB8AC3E}">
+        <p14:creationId xmlns:p14="http://schemas.microsoft.com/office/powerpoint/2010/main" val="2128180402"/>
+      </p:ext>
+    </p:extLst>
+  </p:cSld>
+  <p:clrMapOvr>
+    <a:masterClrMapping/>
+  </p:clrMapOvr>
+</p:sld>
+</file>
+
+<file path=ppt/slides/slide15.xml><?xml version="1.0" encoding="utf-8"?>
+<p:sld xmlns:a="http://schemas.openxmlformats.org/drawingml/2006/main" xmlns:r="http://schemas.openxmlformats.org/officeDocument/2006/relationships" xmlns:p="http://schemas.openxmlformats.org/presentationml/2006/main">
+  <p:cSld>
+    <p:spTree>
+      <p:nvGrpSpPr>
+        <p:cNvPr id="1" name=""/>
+        <p:cNvGrpSpPr/>
+        <p:nvPr/>
+      </p:nvGrpSpPr>
+      <p:grpSpPr>
+        <a:xfrm>
+          <a:off x="0" y="0"/>
+          <a:ext cx="0" cy="0"/>
+          <a:chOff x="0" y="0"/>
+          <a:chExt cx="0" cy="0"/>
+        </a:xfrm>
+      </p:grpSpPr>
+      <p:sp>
+        <p:nvSpPr>
+          <p:cNvPr id="2" name="Title 1"/>
+          <p:cNvSpPr>
+            <a:spLocks noGrp="1"/>
+          </p:cNvSpPr>
+          <p:nvPr>
+            <p:ph type="title"/>
+          </p:nvPr>
+        </p:nvSpPr>
+        <p:spPr/>
+        <p:txBody>
+          <a:bodyPr>
+            <a:normAutofit fontScale="90000"/>
+          </a:bodyPr>
+          <a:lstStyle/>
+          <a:p>
+            <a:r>
+              <a:rPr lang="en-US" dirty="0" smtClean="0"/>
+              <a:t>Handling “Branch Prediction Failure”</a:t>
+            </a:r>
+            <a:endParaRPr lang="en-US" dirty="0"/>
+          </a:p>
+        </p:txBody>
+      </p:sp>
+      <p:sp>
+        <p:nvSpPr>
+          <p:cNvPr id="3" name="Content Placeholder 2"/>
+          <p:cNvSpPr>
+            <a:spLocks noGrp="1"/>
+          </p:cNvSpPr>
+          <p:nvPr>
+            <p:ph idx="1"/>
+          </p:nvPr>
+        </p:nvSpPr>
+        <p:spPr/>
+        <p:txBody>
+          <a:bodyPr>
+            <a:normAutofit fontScale="85000" lnSpcReduction="20000"/>
+          </a:bodyPr>
+          <a:lstStyle/>
+          <a:p>
+            <a:r>
+              <a:rPr lang="en-US" dirty="0" smtClean="0"/>
+              <a:t>CATG used to restart the entire test generation process whenever there was a “branch prediction failure” warning, i.e. </a:t>
+            </a:r>
+            <a:r>
+              <a:rPr lang="en-US" dirty="0" err="1" smtClean="0"/>
+              <a:t>concolic</a:t>
+            </a:r>
+            <a:r>
+              <a:rPr lang="en-US" dirty="0" smtClean="0"/>
+              <a:t> testing is not taking the expected path on a generated input</a:t>
+            </a:r>
+          </a:p>
+          <a:p>
+            <a:r>
+              <a:rPr lang="en-US" dirty="0" smtClean="0"/>
+              <a:t>Created some adverse side-effects in data annotation</a:t>
+            </a:r>
+          </a:p>
+          <a:p>
+            <a:pPr lvl="1"/>
+            <a:r>
+              <a:rPr lang="en-US" dirty="0" smtClean="0"/>
+              <a:t>In data annotation, it is common to get “branch prediction failure” warning</a:t>
+            </a:r>
+          </a:p>
+          <a:p>
+            <a:r>
+              <a:rPr lang="en-US" dirty="0" smtClean="0"/>
+              <a:t>Modified CATG so that “branch prediction failure” state is handled properly</a:t>
+            </a:r>
+          </a:p>
+          <a:p>
+            <a:pPr lvl="1"/>
+            <a:r>
+              <a:rPr lang="en-US" dirty="0" smtClean="0"/>
+              <a:t>Backtrack to the parent branch instead of restart if a “branch prediction failure” happens at a branch</a:t>
+            </a:r>
+          </a:p>
+          <a:p>
+            <a:pPr lvl="1"/>
+            <a:r>
+              <a:rPr lang="en-US" dirty="0" smtClean="0"/>
+              <a:t>Data annotation should now work as expected</a:t>
+            </a:r>
+            <a:endParaRPr lang="en-US" dirty="0"/>
+          </a:p>
+        </p:txBody>
+      </p:sp>
+    </p:spTree>
+    <p:extLst>
+      <p:ext uri="{BB962C8B-B14F-4D97-AF65-F5344CB8AC3E}">
+        <p14:creationId xmlns:p14="http://schemas.microsoft.com/office/powerpoint/2010/main" val="2799436089"/>
+      </p:ext>
+    </p:extLst>
+  </p:cSld>
+  <p:clrMapOvr>
+    <a:masterClrMapping/>
+  </p:clrMapOvr>
+</p:sld>
+</file>
+
+<file path=ppt/slides/slide16.xml><?xml version="1.0" encoding="utf-8"?>
+<p:sld xmlns:a="http://schemas.openxmlformats.org/drawingml/2006/main" xmlns:r="http://schemas.openxmlformats.org/officeDocument/2006/relationships" xmlns:p="http://schemas.openxmlformats.org/presentationml/2006/main">
+  <p:cSld>
+    <p:spTree>
+      <p:nvGrpSpPr>
+        <p:cNvPr id="1" name=""/>
+        <p:cNvGrpSpPr/>
+        <p:nvPr/>
+      </p:nvGrpSpPr>
+      <p:grpSpPr>
+        <a:xfrm>
+          <a:off x="0" y="0"/>
+          <a:ext cx="0" cy="0"/>
+          <a:chOff x="0" y="0"/>
+          <a:chExt cx="0" cy="0"/>
+        </a:xfrm>
+      </p:grpSpPr>
+      <p:sp>
+        <p:nvSpPr>
+          <p:cNvPr id="2" name="Title 1"/>
+          <p:cNvSpPr>
+            <a:spLocks noGrp="1"/>
+          </p:cNvSpPr>
+          <p:nvPr>
+            <p:ph type="title"/>
+          </p:nvPr>
+        </p:nvSpPr>
+        <p:spPr/>
+        <p:txBody>
+          <a:bodyPr/>
+          <a:lstStyle/>
+          <a:p>
+            <a:r>
+              <a:rPr lang="en-US" dirty="0" smtClean="0"/>
+              <a:t>Python scripts for CATG</a:t>
+            </a:r>
+            <a:endParaRPr lang="en-US" dirty="0"/>
+          </a:p>
+        </p:txBody>
+      </p:sp>
+      <p:sp>
+        <p:nvSpPr>
+          <p:cNvPr id="3" name="Content Placeholder 2"/>
+          <p:cNvSpPr>
+            <a:spLocks noGrp="1"/>
+          </p:cNvSpPr>
+          <p:nvPr>
+            <p:ph idx="1"/>
+          </p:nvPr>
+        </p:nvSpPr>
+        <p:spPr/>
+        <p:txBody>
+          <a:bodyPr/>
+          <a:lstStyle/>
+          <a:p>
+            <a:r>
+              <a:rPr lang="en-US" dirty="0" smtClean="0"/>
+              <a:t>Replaced non-portable shell scripts of CATG with portable python scripts</a:t>
+            </a:r>
+          </a:p>
+          <a:p>
+            <a:r>
+              <a:rPr lang="en-US" dirty="0" smtClean="0"/>
+              <a:t>Python </a:t>
+            </a:r>
+            <a:r>
+              <a:rPr lang="en-US" dirty="0" err="1" smtClean="0"/>
+              <a:t>concolic.py</a:t>
+            </a:r>
+            <a:r>
+              <a:rPr lang="en-US" dirty="0" smtClean="0"/>
+              <a:t> gives the usage documentation of the script </a:t>
+            </a:r>
+            <a:endParaRPr lang="en-US" dirty="0"/>
+          </a:p>
+        </p:txBody>
+      </p:sp>
+    </p:spTree>
+    <p:extLst>
+      <p:ext uri="{BB962C8B-B14F-4D97-AF65-F5344CB8AC3E}">
+        <p14:creationId xmlns:p14="http://schemas.microsoft.com/office/powerpoint/2010/main" val="2976351886"/>
+      </p:ext>
+    </p:extLst>
+  </p:cSld>
+  <p:clrMapOvr>
+    <a:masterClrMapping/>
+  </p:clrMapOvr>
+</p:sld>
+</file>
+
+<file path=ppt/slides/slide17.xml><?xml version="1.0" encoding="utf-8"?>
+<p:sld xmlns:a="http://schemas.openxmlformats.org/drawingml/2006/main" xmlns:r="http://schemas.openxmlformats.org/officeDocument/2006/relationships" xmlns:p="http://schemas.openxmlformats.org/presentationml/2006/main">
+  <p:cSld>
+    <p:spTree>
+      <p:nvGrpSpPr>
+        <p:cNvPr id="1" name=""/>
+        <p:cNvGrpSpPr/>
+        <p:nvPr/>
+      </p:nvGrpSpPr>
+      <p:grpSpPr>
+        <a:xfrm>
+          <a:off x="0" y="0"/>
+          <a:ext cx="0" cy="0"/>
+          <a:chOff x="0" y="0"/>
+          <a:chExt cx="0" cy="0"/>
+        </a:xfrm>
+      </p:grpSpPr>
+      <p:sp>
+        <p:nvSpPr>
+          <p:cNvPr id="2" name="Title 1"/>
+          <p:cNvSpPr>
+            <a:spLocks noGrp="1"/>
+          </p:cNvSpPr>
+          <p:nvPr>
+            <p:ph type="title"/>
+          </p:nvPr>
+        </p:nvSpPr>
+        <p:spPr/>
+        <p:txBody>
+          <a:bodyPr/>
+          <a:lstStyle/>
+          <a:p>
+            <a:r>
+              <a:rPr lang="en-US" dirty="0" smtClean="0"/>
+              <a:t>Future Work	</a:t>
+            </a:r>
+            <a:endParaRPr lang="en-US" dirty="0"/>
+          </a:p>
+        </p:txBody>
+      </p:sp>
+      <p:sp>
+        <p:nvSpPr>
+          <p:cNvPr id="3" name="Content Placeholder 2"/>
+          <p:cNvSpPr>
+            <a:spLocks noGrp="1"/>
+          </p:cNvSpPr>
+          <p:nvPr>
+            <p:ph idx="1"/>
+          </p:nvPr>
+        </p:nvSpPr>
+        <p:spPr/>
+        <p:txBody>
+          <a:bodyPr>
+            <a:normAutofit lnSpcReduction="10000"/>
+          </a:bodyPr>
+          <a:lstStyle/>
+          <a:p>
+            <a:r>
+              <a:rPr lang="en-US" dirty="0" smtClean="0"/>
+              <a:t>Improve </a:t>
+            </a:r>
+            <a:r>
+              <a:rPr lang="en-US" dirty="0"/>
+              <a:t>data annotation to handle cases where value passed to a </a:t>
+            </a:r>
+            <a:r>
+              <a:rPr lang="en-US" dirty="0" err="1"/>
+              <a:t>CATG.abstractXXX</a:t>
+            </a:r>
+            <a:r>
+              <a:rPr lang="en-US" dirty="0"/>
+              <a:t>(v) could be symbolic</a:t>
+            </a:r>
+            <a:r>
+              <a:rPr lang="en-US" dirty="0" smtClean="0"/>
+              <a:t>.</a:t>
+            </a:r>
+            <a:endParaRPr lang="en-US" dirty="0"/>
+          </a:p>
+          <a:p>
+            <a:r>
+              <a:rPr lang="en-US" dirty="0" smtClean="0"/>
+              <a:t>Avoid </a:t>
+            </a:r>
+            <a:r>
+              <a:rPr lang="en-US" dirty="0"/>
+              <a:t>restarting JVM for each test input.  This will take considerable effort, but it could speedup CATG by a factor of 5X </a:t>
+            </a:r>
+            <a:r>
+              <a:rPr lang="en-US" dirty="0" smtClean="0"/>
+              <a:t>– 100X.</a:t>
+            </a:r>
+          </a:p>
+          <a:p>
+            <a:r>
+              <a:rPr lang="en-US" dirty="0" smtClean="0"/>
+              <a:t>Once evaluation results of annotation mechanism are available, write a paper on the annotation mechanism</a:t>
+            </a:r>
+            <a:endParaRPr lang="en-US" dirty="0"/>
+          </a:p>
+        </p:txBody>
+      </p:sp>
+    </p:spTree>
+    <p:extLst>
+      <p:ext uri="{BB962C8B-B14F-4D97-AF65-F5344CB8AC3E}">
+        <p14:creationId xmlns:p14="http://schemas.microsoft.com/office/powerpoint/2010/main" val="3006018595"/>
       </p:ext>
     </p:extLst>
   </p:cSld>
@@ -7333,7 +7824,6 @@
               <a:rPr lang="en-US" dirty="0"/>
               <a:t>(1,ret).  This will force Where clause to return true.</a:t>
             </a:r>
-            <a:endParaRPr lang="en-US" dirty="0"/>
           </a:p>
         </p:txBody>
       </p:sp>

</xml_diff>